<commit_message>
PowerPoint Presentation Started :smile:
</commit_message>
<xml_diff>
--- a/Noura Preliminary Exam/Candidacy Presentation.pptx
+++ b/Noura Preliminary Exam/Candidacy Presentation.pptx
@@ -120,6 +120,11 @@
       </a:defRPr>
     </a:lvl9pPr>
   </p:defaultTextStyle>
+  <p:extLst>
+    <p:ext uri="{EFAFB233-063F-42B5-8137-9DF3F51BA10A}">
+      <p15:sldGuideLst xmlns:p15="http://schemas.microsoft.com/office/powerpoint/2012/main"/>
+    </p:ext>
+  </p:extLst>
 </p:presentation>
 </file>
 
@@ -5532,6 +5537,383 @@
           </a:p>
         </p:txBody>
       </p:sp>
+      <p:sp>
+        <p:nvSpPr>
+          <p:cNvPr id="4" name="Rectangle 2">
+            <a:extLst>
+              <a:ext uri="{FF2B5EF4-FFF2-40B4-BE49-F238E27FC236}">
+                <a16:creationId xmlns:a16="http://schemas.microsoft.com/office/drawing/2014/main" id="{781BA739-31AE-564A-BFCE-B6C9E76608BB}"/>
+              </a:ext>
+            </a:extLst>
+          </p:cNvPr>
+          <p:cNvSpPr>
+            <a:spLocks noChangeArrowheads="1"/>
+          </p:cNvSpPr>
+          <p:nvPr/>
+        </p:nvSpPr>
+        <p:spPr bwMode="auto">
+          <a:xfrm>
+            <a:off x="1230705" y="3222856"/>
+            <a:ext cx="3714409" cy="671971"/>
+          </a:xfrm>
+          <a:prstGeom prst="rect">
+            <a:avLst/>
+          </a:prstGeom>
+          <a:noFill/>
+          <a:ln>
+            <a:noFill/>
+          </a:ln>
+          <a:effectLst/>
+          <a:extLst>
+            <a:ext uri="{909E8E84-426E-40DD-AFC4-6F175D3DCCD1}">
+              <a14:hiddenFill xmlns:a14="http://schemas.microsoft.com/office/drawing/2010/main">
+                <a:solidFill>
+                  <a:schemeClr val="accent1"/>
+                </a:solidFill>
+              </a14:hiddenFill>
+            </a:ext>
+            <a:ext uri="{91240B29-F687-4F45-9708-019B960494DF}">
+              <a14:hiddenLine xmlns:a14="http://schemas.microsoft.com/office/drawing/2010/main" w="9525">
+                <a:solidFill>
+                  <a:schemeClr val="tx1"/>
+                </a:solidFill>
+                <a:miter lim="800000"/>
+                <a:headEnd/>
+                <a:tailEnd/>
+              </a14:hiddenLine>
+            </a:ext>
+            <a:ext uri="{AF507438-7753-43E0-B8FC-AC1667EBCBE1}">
+              <a14:hiddenEffects xmlns:a14="http://schemas.microsoft.com/office/drawing/2010/main">
+                <a:effectLst>
+                  <a:outerShdw dist="35921" dir="2700000" algn="ctr" rotWithShape="0">
+                    <a:schemeClr val="bg2"/>
+                  </a:outerShdw>
+                </a:effectLst>
+              </a14:hiddenEffects>
+            </a:ext>
+          </a:extLst>
+        </p:spPr>
+        <p:txBody>
+          <a:bodyPr vert="horz" wrap="square" lIns="0" tIns="25392" rIns="0" bIns="0" numCol="1" anchor="ctr" anchorCtr="0" compatLnSpc="1">
+            <a:prstTxWarp prst="textNoShape">
+              <a:avLst/>
+            </a:prstTxWarp>
+            <a:spAutoFit/>
+          </a:bodyPr>
+          <a:lstStyle/>
+          <a:p>
+            <a:pPr marL="0" marR="0" lvl="0" indent="0" algn="l" defTabSz="914400" rtl="0" eaLnBrk="0" fontAlgn="base" latinLnBrk="0" hangingPunct="0">
+              <a:lnSpc>
+                <a:spcPct val="100000"/>
+              </a:lnSpc>
+              <a:spcBef>
+                <a:spcPct val="0"/>
+              </a:spcBef>
+              <a:spcAft>
+                <a:spcPct val="0"/>
+              </a:spcAft>
+              <a:buClrTx/>
+              <a:buSzTx/>
+              <a:buFontTx/>
+              <a:buNone/>
+              <a:tabLst/>
+            </a:pPr>
+            <a:r>
+              <a:rPr kumimoji="0" lang="en-US" altLang="en-US" sz="1200" b="0" i="1" u="none" strike="noStrike" cap="none" normalizeH="0" baseline="0" dirty="0">
+                <a:ln>
+                  <a:noFill/>
+                </a:ln>
+                <a:solidFill>
+                  <a:srgbClr val="2F5496"/>
+                </a:solidFill>
+                <a:effectLst/>
+                <a:latin typeface="Calibri" panose="020F0502020204030204" pitchFamily="34" charset="0"/>
+                <a:ea typeface="Times New Roman" panose="02020603050405020304" pitchFamily="18" charset="0"/>
+                <a:cs typeface="Times New Roman" panose="02020603050405020304" pitchFamily="18" charset="0"/>
+              </a:rPr>
+              <a:t>Figure 1: Diagram representing the mouse placental cell types and zones from (Bronson &amp; Bale, 2016)</a:t>
+            </a:r>
+            <a:endParaRPr kumimoji="0" lang="en-US" altLang="en-US" sz="1200" b="0" i="1" u="none" strike="noStrike" cap="none" normalizeH="0" baseline="0" dirty="0">
+              <a:ln>
+                <a:noFill/>
+              </a:ln>
+              <a:solidFill>
+                <a:srgbClr val="2F5496"/>
+              </a:solidFill>
+              <a:effectLst/>
+              <a:latin typeface="Calibri Light" panose="020F0302020204030204" pitchFamily="34" charset="0"/>
+              <a:ea typeface="Times New Roman" panose="02020603050405020304" pitchFamily="18" charset="0"/>
+              <a:cs typeface="Times New Roman" panose="02020603050405020304" pitchFamily="18" charset="0"/>
+            </a:endParaRPr>
+          </a:p>
+          <a:p>
+            <a:pPr marL="0" marR="0" lvl="0" indent="0" algn="l" defTabSz="914400" rtl="0" eaLnBrk="0" fontAlgn="base" latinLnBrk="0" hangingPunct="0">
+              <a:lnSpc>
+                <a:spcPct val="100000"/>
+              </a:lnSpc>
+              <a:spcBef>
+                <a:spcPct val="0"/>
+              </a:spcBef>
+              <a:spcAft>
+                <a:spcPct val="0"/>
+              </a:spcAft>
+              <a:buClrTx/>
+              <a:buSzTx/>
+              <a:buFontTx/>
+              <a:buNone/>
+              <a:tabLst/>
+            </a:pPr>
+            <a:endParaRPr kumimoji="0" lang="en-US" altLang="en-US" sz="1800" b="0" i="0" u="none" strike="noStrike" cap="none" normalizeH="0" baseline="0" dirty="0">
+              <a:ln>
+                <a:noFill/>
+              </a:ln>
+              <a:solidFill>
+                <a:schemeClr val="tx1"/>
+              </a:solidFill>
+              <a:effectLst/>
+              <a:latin typeface="Arial" panose="020B0604020202020204" pitchFamily="34" charset="0"/>
+            </a:endParaRPr>
+          </a:p>
+        </p:txBody>
+      </p:sp>
+      <p:pic>
+        <p:nvPicPr>
+          <p:cNvPr id="1025" name="Picture Box" descr="npp2015231f1.jpg">
+            <a:extLst>
+              <a:ext uri="{FF2B5EF4-FFF2-40B4-BE49-F238E27FC236}">
+                <a16:creationId xmlns:a16="http://schemas.microsoft.com/office/drawing/2014/main" id="{E8225FAF-F809-5A4F-8B42-C323B2252A43}"/>
+              </a:ext>
+            </a:extLst>
+          </p:cNvPr>
+          <p:cNvPicPr>
+            <a:picLocks noChangeAspect="1" noChangeArrowheads="1"/>
+          </p:cNvPicPr>
+          <p:nvPr/>
+        </p:nvPicPr>
+        <p:blipFill>
+          <a:blip r:embed="rId2">
+            <a:extLst>
+              <a:ext uri="{28A0092B-C50C-407E-A947-70E740481C1C}">
+                <a14:useLocalDpi xmlns:a14="http://schemas.microsoft.com/office/drawing/2010/main" val="0"/>
+              </a:ext>
+            </a:extLst>
+          </a:blip>
+          <a:srcRect/>
+          <a:stretch>
+            <a:fillRect/>
+          </a:stretch>
+        </p:blipFill>
+        <p:spPr bwMode="auto">
+          <a:xfrm>
+            <a:off x="5943258" y="3130069"/>
+            <a:ext cx="5662613" cy="3523927"/>
+          </a:xfrm>
+          <a:prstGeom prst="rect">
+            <a:avLst/>
+          </a:prstGeom>
+          <a:noFill/>
+          <a:extLst>
+            <a:ext uri="{909E8E84-426E-40DD-AFC4-6F175D3DCCD1}">
+              <a14:hiddenFill xmlns:a14="http://schemas.microsoft.com/office/drawing/2010/main">
+                <a:solidFill>
+                  <a:srgbClr val="FFFFFF"/>
+                </a:solidFill>
+              </a14:hiddenFill>
+            </a:ext>
+          </a:extLst>
+        </p:spPr>
+      </p:pic>
+      <p:sp>
+        <p:nvSpPr>
+          <p:cNvPr id="5" name="Rectangle 3">
+            <a:extLst>
+              <a:ext uri="{FF2B5EF4-FFF2-40B4-BE49-F238E27FC236}">
+                <a16:creationId xmlns:a16="http://schemas.microsoft.com/office/drawing/2014/main" id="{6D094161-A064-454E-AD7D-91CE0FB7B3F1}"/>
+              </a:ext>
+            </a:extLst>
+          </p:cNvPr>
+          <p:cNvSpPr>
+            <a:spLocks noChangeArrowheads="1"/>
+          </p:cNvSpPr>
+          <p:nvPr/>
+        </p:nvSpPr>
+        <p:spPr bwMode="auto">
+          <a:xfrm>
+            <a:off x="1547471" y="4031599"/>
+            <a:ext cx="2753067" cy="600164"/>
+          </a:xfrm>
+          <a:prstGeom prst="rect">
+            <a:avLst/>
+          </a:prstGeom>
+          <a:noFill/>
+          <a:ln>
+            <a:noFill/>
+          </a:ln>
+          <a:effectLst/>
+          <a:extLst>
+            <a:ext uri="{909E8E84-426E-40DD-AFC4-6F175D3DCCD1}">
+              <a14:hiddenFill xmlns:a14="http://schemas.microsoft.com/office/drawing/2010/main">
+                <a:solidFill>
+                  <a:schemeClr val="accent1"/>
+                </a:solidFill>
+              </a14:hiddenFill>
+            </a:ext>
+            <a:ext uri="{91240B29-F687-4F45-9708-019B960494DF}">
+              <a14:hiddenLine xmlns:a14="http://schemas.microsoft.com/office/drawing/2010/main" w="9525">
+                <a:solidFill>
+                  <a:schemeClr val="tx1"/>
+                </a:solidFill>
+                <a:miter lim="800000"/>
+                <a:headEnd/>
+                <a:tailEnd/>
+              </a14:hiddenLine>
+            </a:ext>
+            <a:ext uri="{AF507438-7753-43E0-B8FC-AC1667EBCBE1}">
+              <a14:hiddenEffects xmlns:a14="http://schemas.microsoft.com/office/drawing/2010/main">
+                <a:effectLst>
+                  <a:outerShdw dist="35921" dir="2700000" algn="ctr" rotWithShape="0">
+                    <a:schemeClr val="bg2"/>
+                  </a:outerShdw>
+                </a:effectLst>
+              </a14:hiddenEffects>
+            </a:ext>
+          </a:extLst>
+        </p:spPr>
+        <p:txBody>
+          <a:bodyPr vert="horz" wrap="square" lIns="91440" tIns="45720" rIns="91440" bIns="45720" numCol="1" anchor="ctr" anchorCtr="0" compatLnSpc="1">
+            <a:prstTxWarp prst="textNoShape">
+              <a:avLst/>
+            </a:prstTxWarp>
+            <a:spAutoFit/>
+          </a:bodyPr>
+          <a:lstStyle/>
+          <a:p>
+            <a:pPr marL="0" marR="0" lvl="0" indent="0" algn="l" defTabSz="914400" rtl="0" eaLnBrk="0" fontAlgn="base" latinLnBrk="0" hangingPunct="0">
+              <a:lnSpc>
+                <a:spcPct val="100000"/>
+              </a:lnSpc>
+              <a:spcBef>
+                <a:spcPct val="0"/>
+              </a:spcBef>
+              <a:spcAft>
+                <a:spcPct val="0"/>
+              </a:spcAft>
+              <a:buClrTx/>
+              <a:buSzTx/>
+              <a:buFontTx/>
+              <a:buNone/>
+              <a:tabLst/>
+            </a:pPr>
+            <a:r>
+              <a:rPr kumimoji="0" lang="en-US" altLang="en-US" sz="1100" b="0" i="1" u="none" strike="noStrike" cap="none" normalizeH="0" baseline="0" dirty="0">
+                <a:ln>
+                  <a:noFill/>
+                </a:ln>
+                <a:solidFill>
+                  <a:schemeClr val="tx1"/>
+                </a:solidFill>
+                <a:effectLst/>
+                <a:latin typeface="Calibri" panose="020F0502020204030204" pitchFamily="34" charset="0"/>
+                <a:ea typeface="Times New Roman" panose="02020603050405020304" pitchFamily="18" charset="0"/>
+              </a:rPr>
+              <a:t>Neuropsychopharmacology Reviews</a:t>
+            </a:r>
+            <a:r>
+              <a:rPr kumimoji="0" lang="en-US" altLang="en-US" sz="1100" b="0" i="0" u="none" strike="noStrike" cap="none" normalizeH="0" baseline="0" dirty="0">
+                <a:ln>
+                  <a:noFill/>
+                </a:ln>
+                <a:solidFill>
+                  <a:schemeClr val="tx1"/>
+                </a:solidFill>
+                <a:effectLst/>
+                <a:latin typeface="Calibri" panose="020F0502020204030204" pitchFamily="34" charset="0"/>
+                <a:ea typeface="Times New Roman" panose="02020603050405020304" pitchFamily="18" charset="0"/>
+              </a:rPr>
+              <a:t> (2016) </a:t>
+            </a:r>
+            <a:r>
+              <a:rPr kumimoji="0" lang="en-US" altLang="en-US" sz="1100" b="1" i="0" u="none" strike="noStrike" cap="none" normalizeH="0" baseline="0" dirty="0">
+                <a:ln>
+                  <a:noFill/>
+                </a:ln>
+                <a:solidFill>
+                  <a:schemeClr val="tx1"/>
+                </a:solidFill>
+                <a:effectLst/>
+                <a:latin typeface="Calibri" panose="020F0502020204030204" pitchFamily="34" charset="0"/>
+                <a:ea typeface="Times New Roman" panose="02020603050405020304" pitchFamily="18" charset="0"/>
+              </a:rPr>
+              <a:t>41</a:t>
+            </a:r>
+            <a:r>
+              <a:rPr kumimoji="0" lang="en-US" altLang="en-US" sz="1100" b="0" i="0" u="none" strike="noStrike" cap="none" normalizeH="0" baseline="0" dirty="0">
+                <a:ln>
+                  <a:noFill/>
+                </a:ln>
+                <a:solidFill>
+                  <a:schemeClr val="tx1"/>
+                </a:solidFill>
+                <a:effectLst/>
+                <a:latin typeface="Calibri" panose="020F0502020204030204" pitchFamily="34" charset="0"/>
+                <a:ea typeface="Times New Roman" panose="02020603050405020304" pitchFamily="18" charset="0"/>
+              </a:rPr>
+              <a:t>, 207-218;</a:t>
+            </a:r>
+            <a:endParaRPr kumimoji="0" lang="en-US" altLang="en-US" sz="1000" b="0" i="0" u="none" strike="noStrike" cap="none" normalizeH="0" baseline="0" dirty="0">
+              <a:ln>
+                <a:noFill/>
+              </a:ln>
+              <a:solidFill>
+                <a:schemeClr val="tx1"/>
+              </a:solidFill>
+              <a:effectLst/>
+            </a:endParaRPr>
+          </a:p>
+          <a:p>
+            <a:pPr marL="0" marR="0" lvl="0" indent="0" algn="l" defTabSz="914400" rtl="0" eaLnBrk="0" fontAlgn="base" latinLnBrk="0" hangingPunct="0">
+              <a:lnSpc>
+                <a:spcPct val="100000"/>
+              </a:lnSpc>
+              <a:spcBef>
+                <a:spcPct val="0"/>
+              </a:spcBef>
+              <a:spcAft>
+                <a:spcPct val="0"/>
+              </a:spcAft>
+              <a:buClrTx/>
+              <a:buSzTx/>
+              <a:buFontTx/>
+              <a:buNone/>
+              <a:tabLst/>
+            </a:pPr>
+            <a:r>
+              <a:rPr kumimoji="0" lang="en-US" altLang="en-US" sz="1100" b="0" i="0" u="none" strike="noStrike" cap="none" normalizeH="0" baseline="0" dirty="0">
+                <a:ln>
+                  <a:noFill/>
+                </a:ln>
+                <a:solidFill>
+                  <a:schemeClr val="tx1"/>
+                </a:solidFill>
+                <a:effectLst/>
+                <a:latin typeface="Calibri" panose="020F0502020204030204" pitchFamily="34" charset="0"/>
+                <a:ea typeface="Times New Roman" panose="02020603050405020304" pitchFamily="18" charset="0"/>
+              </a:rPr>
+              <a:t>doi:10.1038/npp.2015.231</a:t>
+            </a:r>
+            <a:endParaRPr kumimoji="0" lang="en-US" altLang="en-US" sz="1800" b="0" i="0" u="none" strike="noStrike" cap="none" normalizeH="0" baseline="0" dirty="0">
+              <a:ln>
+                <a:noFill/>
+              </a:ln>
+              <a:solidFill>
+                <a:schemeClr val="tx1"/>
+              </a:solidFill>
+              <a:effectLst/>
+              <a:latin typeface="Arial" panose="020B0604020202020204" pitchFamily="34" charset="0"/>
+            </a:endParaRPr>
+          </a:p>
+        </p:txBody>
+      </p:sp>
     </p:spTree>
     <p:extLst>
       <p:ext uri="{BB962C8B-B14F-4D97-AF65-F5344CB8AC3E}">
@@ -5614,8 +5996,8 @@
         </p:blipFill>
         <p:spPr>
           <a:xfrm>
-            <a:off x="894522" y="1490868"/>
-            <a:ext cx="10541693" cy="5608291"/>
+            <a:off x="419726" y="1596571"/>
+            <a:ext cx="12516786" cy="5502588"/>
           </a:xfrm>
         </p:spPr>
       </p:pic>

</xml_diff>